<commit_message>
Add 6.1 Bounds Action
</commit_message>
<xml_diff>
--- a/Programming 4/05.1 Directional Sprites/05.1 Directional Sprites.pptx
+++ b/Programming 4/05.1 Directional Sprites/05.1 Directional Sprites.pptx
@@ -225,7 +225,7 @@
           <a:p>
             <a:fld id="{A52373F4-E0B6-AB43-80EF-246983C958D0}" type="datetimeFigureOut">
               <a:rPr lang="en-US" smtClean="0"/>
-              <a:t>8/21/19</a:t>
+              <a:t>8/21/2019</a:t>
             </a:fld>
             <a:endParaRPr lang="en-US"/>
           </a:p>
@@ -4245,7 +4245,7 @@
           <a:p>
             <a:fld id="{F8166F1F-CE9B-4651-A6AA-CD717754106B}" type="datetimeFigureOut">
               <a:rPr lang="en-US" smtClean="0"/>
-              <a:t>8/21/19</a:t>
+              <a:t>8/21/2019</a:t>
             </a:fld>
             <a:endParaRPr lang="en-US"/>
           </a:p>
@@ -4410,7 +4410,7 @@
           <a:p>
             <a:fld id="{A76116CE-C4A3-4A05-B2D7-7C2E9A889C0F}" type="datetimeFigureOut">
               <a:rPr lang="en-US" smtClean="0"/>
-              <a:t>8/21/19</a:t>
+              <a:t>8/21/2019</a:t>
             </a:fld>
             <a:endParaRPr lang="en-US"/>
           </a:p>
@@ -4585,7 +4585,7 @@
           <a:p>
             <a:fld id="{A76116CE-C4A3-4A05-B2D7-7C2E9A889C0F}" type="datetimeFigureOut">
               <a:rPr lang="en-US" smtClean="0"/>
-              <a:t>8/21/19</a:t>
+              <a:t>8/21/2019</a:t>
             </a:fld>
             <a:endParaRPr lang="en-US"/>
           </a:p>
@@ -4752,7 +4752,7 @@
           <a:p>
             <a:fld id="{A76116CE-C4A3-4A05-B2D7-7C2E9A889C0F}" type="datetimeFigureOut">
               <a:rPr lang="en-US" smtClean="0"/>
-              <a:t>8/21/19</a:t>
+              <a:t>8/21/2019</a:t>
             </a:fld>
             <a:endParaRPr lang="en-US"/>
           </a:p>
@@ -4993,7 +4993,7 @@
           <a:p>
             <a:fld id="{A76116CE-C4A3-4A05-B2D7-7C2E9A889C0F}" type="datetimeFigureOut">
               <a:rPr lang="en-US" smtClean="0"/>
-              <a:t>8/21/19</a:t>
+              <a:t>8/21/2019</a:t>
             </a:fld>
             <a:endParaRPr lang="en-US"/>
           </a:p>
@@ -5276,7 +5276,7 @@
           <a:p>
             <a:fld id="{A76116CE-C4A3-4A05-B2D7-7C2E9A889C0F}" type="datetimeFigureOut">
               <a:rPr lang="en-US" smtClean="0"/>
-              <a:t>8/21/19</a:t>
+              <a:t>8/21/2019</a:t>
             </a:fld>
             <a:endParaRPr lang="en-US"/>
           </a:p>
@@ -5693,7 +5693,7 @@
           <a:p>
             <a:fld id="{A76116CE-C4A3-4A05-B2D7-7C2E9A889C0F}" type="datetimeFigureOut">
               <a:rPr lang="en-US" smtClean="0"/>
-              <a:t>8/21/19</a:t>
+              <a:t>8/21/2019</a:t>
             </a:fld>
             <a:endParaRPr lang="en-US"/>
           </a:p>
@@ -5806,7 +5806,7 @@
           <a:p>
             <a:fld id="{A76116CE-C4A3-4A05-B2D7-7C2E9A889C0F}" type="datetimeFigureOut">
               <a:rPr lang="en-US" smtClean="0"/>
-              <a:t>8/21/19</a:t>
+              <a:t>8/21/2019</a:t>
             </a:fld>
             <a:endParaRPr lang="en-US"/>
           </a:p>
@@ -5896,7 +5896,7 @@
           <a:p>
             <a:fld id="{A76116CE-C4A3-4A05-B2D7-7C2E9A889C0F}" type="datetimeFigureOut">
               <a:rPr lang="en-US" smtClean="0"/>
-              <a:t>8/21/19</a:t>
+              <a:t>8/21/2019</a:t>
             </a:fld>
             <a:endParaRPr lang="en-US"/>
           </a:p>
@@ -6168,7 +6168,7 @@
           <a:p>
             <a:fld id="{A76116CE-C4A3-4A05-B2D7-7C2E9A889C0F}" type="datetimeFigureOut">
               <a:rPr lang="en-US" smtClean="0"/>
-              <a:t>8/21/19</a:t>
+              <a:t>8/21/2019</a:t>
             </a:fld>
             <a:endParaRPr lang="en-US"/>
           </a:p>
@@ -6416,7 +6416,7 @@
           <a:p>
             <a:fld id="{A76116CE-C4A3-4A05-B2D7-7C2E9A889C0F}" type="datetimeFigureOut">
               <a:rPr lang="en-US" smtClean="0"/>
-              <a:t>8/21/19</a:t>
+              <a:t>8/21/2019</a:t>
             </a:fld>
             <a:endParaRPr lang="en-US"/>
           </a:p>
@@ -6624,7 +6624,7 @@
           <a:p>
             <a:fld id="{F8166F1F-CE9B-4651-A6AA-CD717754106B}" type="datetimeFigureOut">
               <a:rPr lang="en-US" smtClean="0"/>
-              <a:t>8/21/19</a:t>
+              <a:t>8/21/2019</a:t>
             </a:fld>
             <a:endParaRPr lang="en-US"/>
           </a:p>
@@ -7752,21 +7752,21 @@
                 <a:gridCol w="2505205">
                   <a:extLst>
                     <a:ext uri="{9D8B030D-6E8A-4147-A177-3AD203B41FA5}">
-                      <a16:colId xmlns="" xmlns:a16="http://schemas.microsoft.com/office/drawing/2014/main" val="4216884713"/>
+                      <a16:colId xmlns:a16="http://schemas.microsoft.com/office/drawing/2014/main" val="4216884713"/>
                     </a:ext>
                   </a:extLst>
                 </a:gridCol>
                 <a:gridCol w="2505205">
                   <a:extLst>
                     <a:ext uri="{9D8B030D-6E8A-4147-A177-3AD203B41FA5}">
-                      <a16:colId xmlns="" xmlns:a16="http://schemas.microsoft.com/office/drawing/2014/main" val="3045886549"/>
+                      <a16:colId xmlns:a16="http://schemas.microsoft.com/office/drawing/2014/main" val="3045886549"/>
                     </a:ext>
                   </a:extLst>
                 </a:gridCol>
                 <a:gridCol w="2505205">
                   <a:extLst>
                     <a:ext uri="{9D8B030D-6E8A-4147-A177-3AD203B41FA5}">
-                      <a16:colId xmlns="" xmlns:a16="http://schemas.microsoft.com/office/drawing/2014/main" val="4115596541"/>
+                      <a16:colId xmlns:a16="http://schemas.microsoft.com/office/drawing/2014/main" val="4115596541"/>
                     </a:ext>
                   </a:extLst>
                 </a:gridCol>
@@ -7835,7 +7835,7 @@
                 </a:tc>
                 <a:extLst>
                   <a:ext uri="{0D108BD9-81ED-4DB2-BD59-A6C34878D82A}">
-                    <a16:rowId xmlns="" xmlns:a16="http://schemas.microsoft.com/office/drawing/2014/main" val="754703717"/>
+                    <a16:rowId xmlns:a16="http://schemas.microsoft.com/office/drawing/2014/main" val="754703717"/>
                   </a:ext>
                 </a:extLst>
               </a:tr>
@@ -7887,7 +7887,7 @@
                 </a:tc>
                 <a:extLst>
                   <a:ext uri="{0D108BD9-81ED-4DB2-BD59-A6C34878D82A}">
-                    <a16:rowId xmlns="" xmlns:a16="http://schemas.microsoft.com/office/drawing/2014/main" val="3809389524"/>
+                    <a16:rowId xmlns:a16="http://schemas.microsoft.com/office/drawing/2014/main" val="3809389524"/>
                   </a:ext>
                 </a:extLst>
               </a:tr>
@@ -7939,7 +7939,7 @@
                 </a:tc>
                 <a:extLst>
                   <a:ext uri="{0D108BD9-81ED-4DB2-BD59-A6C34878D82A}">
-                    <a16:rowId xmlns="" xmlns:a16="http://schemas.microsoft.com/office/drawing/2014/main" val="1967603967"/>
+                    <a16:rowId xmlns:a16="http://schemas.microsoft.com/office/drawing/2014/main" val="1967603967"/>
                   </a:ext>
                 </a:extLst>
               </a:tr>
@@ -7991,7 +7991,7 @@
                 </a:tc>
                 <a:extLst>
                   <a:ext uri="{0D108BD9-81ED-4DB2-BD59-A6C34878D82A}">
-                    <a16:rowId xmlns="" xmlns:a16="http://schemas.microsoft.com/office/drawing/2014/main" val="2976321143"/>
+                    <a16:rowId xmlns:a16="http://schemas.microsoft.com/office/drawing/2014/main" val="2976321143"/>
                   </a:ext>
                 </a:extLst>
               </a:tr>
@@ -8043,7 +8043,7 @@
                 </a:tc>
                 <a:extLst>
                   <a:ext uri="{0D108BD9-81ED-4DB2-BD59-A6C34878D82A}">
-                    <a16:rowId xmlns="" xmlns:a16="http://schemas.microsoft.com/office/drawing/2014/main" val="284325855"/>
+                    <a16:rowId xmlns:a16="http://schemas.microsoft.com/office/drawing/2014/main" val="284325855"/>
                   </a:ext>
                 </a:extLst>
               </a:tr>
@@ -8204,21 +8204,21 @@
                 <a:gridCol w="2505205">
                   <a:extLst>
                     <a:ext uri="{9D8B030D-6E8A-4147-A177-3AD203B41FA5}">
-                      <a16:colId xmlns="" xmlns:a16="http://schemas.microsoft.com/office/drawing/2014/main" val="4216884713"/>
+                      <a16:colId xmlns:a16="http://schemas.microsoft.com/office/drawing/2014/main" val="4216884713"/>
                     </a:ext>
                   </a:extLst>
                 </a:gridCol>
                 <a:gridCol w="2505205">
                   <a:extLst>
                     <a:ext uri="{9D8B030D-6E8A-4147-A177-3AD203B41FA5}">
-                      <a16:colId xmlns="" xmlns:a16="http://schemas.microsoft.com/office/drawing/2014/main" val="3045886549"/>
+                      <a16:colId xmlns:a16="http://schemas.microsoft.com/office/drawing/2014/main" val="3045886549"/>
                     </a:ext>
                   </a:extLst>
                 </a:gridCol>
                 <a:gridCol w="2505205">
                   <a:extLst>
                     <a:ext uri="{9D8B030D-6E8A-4147-A177-3AD203B41FA5}">
-                      <a16:colId xmlns="" xmlns:a16="http://schemas.microsoft.com/office/drawing/2014/main" val="4115596541"/>
+                      <a16:colId xmlns:a16="http://schemas.microsoft.com/office/drawing/2014/main" val="4115596541"/>
                     </a:ext>
                   </a:extLst>
                 </a:gridCol>
@@ -8287,7 +8287,7 @@
                 </a:tc>
                 <a:extLst>
                   <a:ext uri="{0D108BD9-81ED-4DB2-BD59-A6C34878D82A}">
-                    <a16:rowId xmlns="" xmlns:a16="http://schemas.microsoft.com/office/drawing/2014/main" val="754703717"/>
+                    <a16:rowId xmlns:a16="http://schemas.microsoft.com/office/drawing/2014/main" val="754703717"/>
                   </a:ext>
                 </a:extLst>
               </a:tr>
@@ -8339,7 +8339,7 @@
                 </a:tc>
                 <a:extLst>
                   <a:ext uri="{0D108BD9-81ED-4DB2-BD59-A6C34878D82A}">
-                    <a16:rowId xmlns="" xmlns:a16="http://schemas.microsoft.com/office/drawing/2014/main" val="3809389524"/>
+                    <a16:rowId xmlns:a16="http://schemas.microsoft.com/office/drawing/2014/main" val="3809389524"/>
                   </a:ext>
                 </a:extLst>
               </a:tr>
@@ -8391,7 +8391,7 @@
                 </a:tc>
                 <a:extLst>
                   <a:ext uri="{0D108BD9-81ED-4DB2-BD59-A6C34878D82A}">
-                    <a16:rowId xmlns="" xmlns:a16="http://schemas.microsoft.com/office/drawing/2014/main" val="1967603967"/>
+                    <a16:rowId xmlns:a16="http://schemas.microsoft.com/office/drawing/2014/main" val="1967603967"/>
                   </a:ext>
                 </a:extLst>
               </a:tr>
@@ -8443,7 +8443,7 @@
                 </a:tc>
                 <a:extLst>
                   <a:ext uri="{0D108BD9-81ED-4DB2-BD59-A6C34878D82A}">
-                    <a16:rowId xmlns="" xmlns:a16="http://schemas.microsoft.com/office/drawing/2014/main" val="2976321143"/>
+                    <a16:rowId xmlns:a16="http://schemas.microsoft.com/office/drawing/2014/main" val="2976321143"/>
                   </a:ext>
                 </a:extLst>
               </a:tr>
@@ -8495,7 +8495,7 @@
                 </a:tc>
                 <a:extLst>
                   <a:ext uri="{0D108BD9-81ED-4DB2-BD59-A6C34878D82A}">
-                    <a16:rowId xmlns="" xmlns:a16="http://schemas.microsoft.com/office/drawing/2014/main" val="284325855"/>
+                    <a16:rowId xmlns:a16="http://schemas.microsoft.com/office/drawing/2014/main" val="284325855"/>
                   </a:ext>
                 </a:extLst>
               </a:tr>
@@ -9200,7 +9200,7 @@
         <p:spPr>
           <a:xfrm>
             <a:off x="6096" y="6096"/>
-            <a:ext cx="9144000" cy="3531736"/>
+            <a:ext cx="9144000" cy="3147015"/>
           </a:xfrm>
           <a:prstGeom prst="rect">
             <a:avLst/>
@@ -9225,13 +9225,6 @@
           </a:p>
           <a:p>
             <a:pPr lvl="2"/>
-            <a:endParaRPr lang="en-US" sz="2500" dirty="0" smtClean="0"/>
-          </a:p>
-          <a:p>
-            <a:pPr marL="1657350" lvl="2" indent="-742950">
-              <a:buFont typeface="Arial" panose="020B0604020202020204" pitchFamily="34" charset="0"/>
-              <a:buChar char="•"/>
-            </a:pPr>
             <a:endParaRPr lang="en-US" sz="2500" dirty="0"/>
           </a:p>
           <a:p>
@@ -10271,7 +10264,7 @@
           <p:nvPr/>
         </p:nvPicPr>
         <p:blipFill>
-          <a:blip r:embed="rId3">
+          <a:blip r:embed="rId3" cstate="print">
             <a:extLst>
               <a:ext uri="{28A0092B-C50C-407E-A947-70E740481C1C}">
                 <a14:useLocalDpi xmlns:a14="http://schemas.microsoft.com/office/drawing/2010/main" val="0"/>
@@ -10423,7 +10416,7 @@
           <p:nvPr/>
         </p:nvPicPr>
         <p:blipFill>
-          <a:blip r:embed="rId3">
+          <a:blip r:embed="rId3" cstate="print">
             <a:extLst>
               <a:ext uri="{28A0092B-C50C-407E-A947-70E740481C1C}">
                 <a14:useLocalDpi xmlns:a14="http://schemas.microsoft.com/office/drawing/2010/main" val="0"/>

</xml_diff>